<commit_message>
Update Int Num Intro
</commit_message>
<xml_diff>
--- a/InterfacageNumerique/APC/S6_IntNum_APC.pptx
+++ b/InterfacageNumerique/APC/S6_IntNum_APC.pptx
@@ -234,7 +234,7 @@
           <a:p>
             <a:fld id="{729C724E-499D-43AC-8699-CF969D2466FC}" type="datetimeFigureOut">
               <a:rPr lang="fr-FR" smtClean="0"/>
-              <a:t>27/01/2025</a:t>
+              <a:t>28/11/2025</a:t>
             </a:fld>
             <a:endParaRPr lang="fr-FR"/>
           </a:p>
@@ -2877,7 +2877,7 @@
           <a:p>
             <a:fld id="{02AC24A9-CCB6-4F8D-B8DB-C2F3692CFA5A}" type="datetimeFigureOut">
               <a:rPr lang="en-US" smtClean="0"/>
-              <a:t>1/27/2025</a:t>
+              <a:t>11/28/2025</a:t>
             </a:fld>
             <a:endParaRPr lang="en-US" dirty="0"/>
           </a:p>
@@ -3247,7 +3247,7 @@
           <a:p>
             <a:fld id="{02AC24A9-CCB6-4F8D-B8DB-C2F3692CFA5A}" type="datetimeFigureOut">
               <a:rPr lang="en-US" smtClean="0"/>
-              <a:t>1/27/2025</a:t>
+              <a:t>11/28/2025</a:t>
             </a:fld>
             <a:endParaRPr lang="en-US"/>
           </a:p>
@@ -3456,7 +3456,7 @@
           <a:p>
             <a:fld id="{02AC24A9-CCB6-4F8D-B8DB-C2F3692CFA5A}" type="datetimeFigureOut">
               <a:rPr lang="en-US" smtClean="0"/>
-              <a:t>1/27/2025</a:t>
+              <a:t>11/28/2025</a:t>
             </a:fld>
             <a:endParaRPr lang="en-US"/>
           </a:p>
@@ -3926,7 +3926,7 @@
           <a:p>
             <a:fld id="{02AC24A9-CCB6-4F8D-B8DB-C2F3692CFA5A}" type="datetimeFigureOut">
               <a:rPr lang="en-US" smtClean="0"/>
-              <a:t>1/27/2025</a:t>
+              <a:t>11/28/2025</a:t>
             </a:fld>
             <a:endParaRPr lang="en-US"/>
           </a:p>
@@ -4380,7 +4380,7 @@
           <a:p>
             <a:fld id="{02AC24A9-CCB6-4F8D-B8DB-C2F3692CFA5A}" type="datetimeFigureOut">
               <a:rPr lang="en-US" smtClean="0"/>
-              <a:t>1/27/2025</a:t>
+              <a:t>11/28/2025</a:t>
             </a:fld>
             <a:endParaRPr lang="en-US"/>
           </a:p>
@@ -4912,7 +4912,7 @@
           <a:p>
             <a:fld id="{02AC24A9-CCB6-4F8D-B8DB-C2F3692CFA5A}" type="datetimeFigureOut">
               <a:rPr lang="en-US" smtClean="0"/>
-              <a:t>1/27/2025</a:t>
+              <a:t>11/28/2025</a:t>
             </a:fld>
             <a:endParaRPr lang="en-US"/>
           </a:p>
@@ -5611,7 +5611,7 @@
           <a:p>
             <a:fld id="{02AC24A9-CCB6-4F8D-B8DB-C2F3692CFA5A}" type="datetimeFigureOut">
               <a:rPr lang="en-US" smtClean="0"/>
-              <a:t>1/27/2025</a:t>
+              <a:t>11/28/2025</a:t>
             </a:fld>
             <a:endParaRPr lang="en-US"/>
           </a:p>
@@ -5940,7 +5940,7 @@
           <a:p>
             <a:fld id="{02AC24A9-CCB6-4F8D-B8DB-C2F3692CFA5A}" type="datetimeFigureOut">
               <a:rPr lang="en-US" smtClean="0"/>
-              <a:t>1/27/2025</a:t>
+              <a:t>11/28/2025</a:t>
             </a:fld>
             <a:endParaRPr lang="en-US"/>
           </a:p>
@@ -6053,7 +6053,7 @@
           <a:p>
             <a:fld id="{02AC24A9-CCB6-4F8D-B8DB-C2F3692CFA5A}" type="datetimeFigureOut">
               <a:rPr lang="en-US" smtClean="0"/>
-              <a:t>1/27/2025</a:t>
+              <a:t>11/28/2025</a:t>
             </a:fld>
             <a:endParaRPr lang="en-US"/>
           </a:p>
@@ -6548,7 +6548,7 @@
           <a:p>
             <a:fld id="{02AC24A9-CCB6-4F8D-B8DB-C2F3692CFA5A}" type="datetimeFigureOut">
               <a:rPr lang="en-US" smtClean="0"/>
-              <a:t>1/27/2025</a:t>
+              <a:t>11/28/2025</a:t>
             </a:fld>
             <a:endParaRPr lang="en-US" dirty="0"/>
           </a:p>
@@ -7025,7 +7025,7 @@
           <a:p>
             <a:fld id="{02AC24A9-CCB6-4F8D-B8DB-C2F3692CFA5A}" type="datetimeFigureOut">
               <a:rPr lang="en-US" smtClean="0"/>
-              <a:t>1/27/2025</a:t>
+              <a:t>11/28/2025</a:t>
             </a:fld>
             <a:endParaRPr lang="en-US"/>
           </a:p>
@@ -7268,7 +7268,7 @@
           <a:p>
             <a:fld id="{02AC24A9-CCB6-4F8D-B8DB-C2F3692CFA5A}" type="datetimeFigureOut">
               <a:rPr lang="en-US" smtClean="0"/>
-              <a:t>1/27/2025</a:t>
+              <a:t>11/28/2025</a:t>
             </a:fld>
             <a:endParaRPr lang="en-US"/>
           </a:p>
@@ -11891,7 +11891,7 @@
                   <a:srgbClr val="002060"/>
                 </a:solidFill>
               </a:rPr>
-              <a:t>26 mai 2025</a:t>
+              <a:t>21 mai 2026</a:t>
             </a:r>
           </a:p>
         </p:txBody>

</xml_diff>